<commit_message>
working code with optional pin
</commit_message>
<xml_diff>
--- a/Viewport - Design Ideas.pptx
+++ b/Viewport - Design Ideas.pptx
@@ -113,7 +113,110 @@
       </a:defRPr>
     </a:lvl9pPr>
   </p:defaultTextStyle>
+  <p:extLst>
+    <p:ext uri="{EFAFB233-063F-42B5-8137-9DF3F51BA10A}">
+      <p15:sldGuideLst xmlns:p15="http://schemas.microsoft.com/office/powerpoint/2012/main"/>
+    </p:ext>
+  </p:extLst>
 </p:presentation>
+</file>
+
+<file path=ppt/changesInfos/changesInfo1.xml><?xml version="1.0" encoding="utf-8"?>
+<pc:chgInfo xmlns:a="http://schemas.openxmlformats.org/drawingml/2006/main" xmlns:r="http://schemas.openxmlformats.org/officeDocument/2006/relationships" xmlns:ac="http://schemas.microsoft.com/office/drawing/2013/main/command" xmlns:pc="http://schemas.microsoft.com/office/powerpoint/2013/main/command">
+  <pc:docChgLst>
+    <pc:chgData name="Elliott Denis" userId="95ca5700b14b8956" providerId="LiveId" clId="{7BDE861C-E36D-DF4E-AC96-7E06FC79DD02}"/>
+    <pc:docChg chg="modSld">
+      <pc:chgData name="Elliott Denis" userId="95ca5700b14b8956" providerId="LiveId" clId="{7BDE861C-E36D-DF4E-AC96-7E06FC79DD02}" dt="2025-10-17T01:55:27.127" v="10" actId="2711"/>
+      <pc:docMkLst>
+        <pc:docMk/>
+      </pc:docMkLst>
+      <pc:sldChg chg="modSp mod">
+        <pc:chgData name="Elliott Denis" userId="95ca5700b14b8956" providerId="LiveId" clId="{7BDE861C-E36D-DF4E-AC96-7E06FC79DD02}" dt="2025-10-17T01:54:45.825" v="1" actId="2711"/>
+        <pc:sldMkLst>
+          <pc:docMk/>
+          <pc:sldMk cId="1725448342" sldId="256"/>
+        </pc:sldMkLst>
+        <pc:spChg chg="mod">
+          <ac:chgData name="Elliott Denis" userId="95ca5700b14b8956" providerId="LiveId" clId="{7BDE861C-E36D-DF4E-AC96-7E06FC79DD02}" dt="2025-10-17T01:54:39.896" v="0" actId="2711"/>
+          <ac:spMkLst>
+            <pc:docMk/>
+            <pc:sldMk cId="1725448342" sldId="256"/>
+            <ac:spMk id="2" creationId="{CD641922-7ED9-5646-F0EF-F0EDCDA7B519}"/>
+          </ac:spMkLst>
+        </pc:spChg>
+        <pc:spChg chg="mod">
+          <ac:chgData name="Elliott Denis" userId="95ca5700b14b8956" providerId="LiveId" clId="{7BDE861C-E36D-DF4E-AC96-7E06FC79DD02}" dt="2025-10-17T01:54:45.825" v="1" actId="2711"/>
+          <ac:spMkLst>
+            <pc:docMk/>
+            <pc:sldMk cId="1725448342" sldId="256"/>
+            <ac:spMk id="3" creationId="{0A4E5B51-48BD-6E5F-6708-ABF5A64D5308}"/>
+          </ac:spMkLst>
+        </pc:spChg>
+      </pc:sldChg>
+      <pc:sldChg chg="modSp mod">
+        <pc:chgData name="Elliott Denis" userId="95ca5700b14b8956" providerId="LiveId" clId="{7BDE861C-E36D-DF4E-AC96-7E06FC79DD02}" dt="2025-10-17T01:55:27.127" v="10" actId="2711"/>
+        <pc:sldMkLst>
+          <pc:docMk/>
+          <pc:sldMk cId="2134986430" sldId="258"/>
+        </pc:sldMkLst>
+        <pc:spChg chg="mod">
+          <ac:chgData name="Elliott Denis" userId="95ca5700b14b8956" providerId="LiveId" clId="{7BDE861C-E36D-DF4E-AC96-7E06FC79DD02}" dt="2025-10-17T01:55:27.127" v="10" actId="2711"/>
+          <ac:spMkLst>
+            <pc:docMk/>
+            <pc:sldMk cId="2134986430" sldId="258"/>
+            <ac:spMk id="2" creationId="{D45FBAA6-EBB6-0850-469E-D2A2D250A7F8}"/>
+          </ac:spMkLst>
+        </pc:spChg>
+      </pc:sldChg>
+      <pc:sldChg chg="modSp mod">
+        <pc:chgData name="Elliott Denis" userId="95ca5700b14b8956" providerId="LiveId" clId="{7BDE861C-E36D-DF4E-AC96-7E06FC79DD02}" dt="2025-10-17T01:55:12.014" v="4" actId="2711"/>
+        <pc:sldMkLst>
+          <pc:docMk/>
+          <pc:sldMk cId="1680014664" sldId="262"/>
+        </pc:sldMkLst>
+        <pc:spChg chg="mod">
+          <ac:chgData name="Elliott Denis" userId="95ca5700b14b8956" providerId="LiveId" clId="{7BDE861C-E36D-DF4E-AC96-7E06FC79DD02}" dt="2025-10-17T01:54:55.444" v="2" actId="2711"/>
+          <ac:spMkLst>
+            <pc:docMk/>
+            <pc:sldMk cId="1680014664" sldId="262"/>
+            <ac:spMk id="2" creationId="{051F7A9B-F857-90D1-2446-40AF68EAF40E}"/>
+          </ac:spMkLst>
+        </pc:spChg>
+        <pc:spChg chg="mod">
+          <ac:chgData name="Elliott Denis" userId="95ca5700b14b8956" providerId="LiveId" clId="{7BDE861C-E36D-DF4E-AC96-7E06FC79DD02}" dt="2025-10-17T01:55:12.014" v="4" actId="2711"/>
+          <ac:spMkLst>
+            <pc:docMk/>
+            <pc:sldMk cId="1680014664" sldId="262"/>
+            <ac:spMk id="3" creationId="{0E7B9107-059C-4F8B-D20A-4125EFD7B3BF}"/>
+          </ac:spMkLst>
+        </pc:spChg>
+      </pc:sldChg>
+      <pc:sldChg chg="modSp mod">
+        <pc:chgData name="Elliott Denis" userId="95ca5700b14b8956" providerId="LiveId" clId="{7BDE861C-E36D-DF4E-AC96-7E06FC79DD02}" dt="2025-10-17T01:55:22.698" v="9" actId="20577"/>
+        <pc:sldMkLst>
+          <pc:docMk/>
+          <pc:sldMk cId="4108944765" sldId="263"/>
+        </pc:sldMkLst>
+        <pc:spChg chg="mod">
+          <ac:chgData name="Elliott Denis" userId="95ca5700b14b8956" providerId="LiveId" clId="{7BDE861C-E36D-DF4E-AC96-7E06FC79DD02}" dt="2025-10-17T01:55:17.232" v="5" actId="2711"/>
+          <ac:spMkLst>
+            <pc:docMk/>
+            <pc:sldMk cId="4108944765" sldId="263"/>
+            <ac:spMk id="2" creationId="{B0EB27BC-19ED-46C8-B7E8-4D0F7206B521}"/>
+          </ac:spMkLst>
+        </pc:spChg>
+        <pc:spChg chg="mod">
+          <ac:chgData name="Elliott Denis" userId="95ca5700b14b8956" providerId="LiveId" clId="{7BDE861C-E36D-DF4E-AC96-7E06FC79DD02}" dt="2025-10-17T01:55:22.698" v="9" actId="20577"/>
+          <ac:spMkLst>
+            <pc:docMk/>
+            <pc:sldMk cId="4108944765" sldId="263"/>
+            <ac:spMk id="3" creationId="{F4E1F9C9-58C9-815C-0E43-EE2E4BCFD0BA}"/>
+          </ac:spMkLst>
+        </pc:spChg>
+      </pc:sldChg>
+    </pc:docChg>
+  </pc:docChgLst>
+</pc:chgInfo>
 </file>
 
 <file path=ppt/slideLayouts/slideLayout1.xml><?xml version="1.0" encoding="utf-8"?>
@@ -265,7 +368,7 @@
           <a:p>
             <a:fld id="{5E7C8677-3CB4-8D4B-92CE-473270A12EDD}" type="datetimeFigureOut">
               <a:rPr lang="en-US" smtClean="0"/>
-              <a:t>10/8/25</a:t>
+              <a:t>10/17/25</a:t>
             </a:fld>
             <a:endParaRPr lang="en-US"/>
           </a:p>
@@ -465,7 +568,7 @@
           <a:p>
             <a:fld id="{5E7C8677-3CB4-8D4B-92CE-473270A12EDD}" type="datetimeFigureOut">
               <a:rPr lang="en-US" smtClean="0"/>
-              <a:t>10/8/25</a:t>
+              <a:t>10/17/25</a:t>
             </a:fld>
             <a:endParaRPr lang="en-US"/>
           </a:p>
@@ -675,7 +778,7 @@
           <a:p>
             <a:fld id="{5E7C8677-3CB4-8D4B-92CE-473270A12EDD}" type="datetimeFigureOut">
               <a:rPr lang="en-US" smtClean="0"/>
-              <a:t>10/8/25</a:t>
+              <a:t>10/17/25</a:t>
             </a:fld>
             <a:endParaRPr lang="en-US"/>
           </a:p>
@@ -875,7 +978,7 @@
           <a:p>
             <a:fld id="{5E7C8677-3CB4-8D4B-92CE-473270A12EDD}" type="datetimeFigureOut">
               <a:rPr lang="en-US" smtClean="0"/>
-              <a:t>10/8/25</a:t>
+              <a:t>10/17/25</a:t>
             </a:fld>
             <a:endParaRPr lang="en-US"/>
           </a:p>
@@ -1151,7 +1254,7 @@
           <a:p>
             <a:fld id="{5E7C8677-3CB4-8D4B-92CE-473270A12EDD}" type="datetimeFigureOut">
               <a:rPr lang="en-US" smtClean="0"/>
-              <a:t>10/8/25</a:t>
+              <a:t>10/17/25</a:t>
             </a:fld>
             <a:endParaRPr lang="en-US"/>
           </a:p>
@@ -1419,7 +1522,7 @@
           <a:p>
             <a:fld id="{5E7C8677-3CB4-8D4B-92CE-473270A12EDD}" type="datetimeFigureOut">
               <a:rPr lang="en-US" smtClean="0"/>
-              <a:t>10/8/25</a:t>
+              <a:t>10/17/25</a:t>
             </a:fld>
             <a:endParaRPr lang="en-US"/>
           </a:p>
@@ -1834,7 +1937,7 @@
           <a:p>
             <a:fld id="{5E7C8677-3CB4-8D4B-92CE-473270A12EDD}" type="datetimeFigureOut">
               <a:rPr lang="en-US" smtClean="0"/>
-              <a:t>10/8/25</a:t>
+              <a:t>10/17/25</a:t>
             </a:fld>
             <a:endParaRPr lang="en-US"/>
           </a:p>
@@ -1976,7 +2079,7 @@
           <a:p>
             <a:fld id="{5E7C8677-3CB4-8D4B-92CE-473270A12EDD}" type="datetimeFigureOut">
               <a:rPr lang="en-US" smtClean="0"/>
-              <a:t>10/8/25</a:t>
+              <a:t>10/17/25</a:t>
             </a:fld>
             <a:endParaRPr lang="en-US"/>
           </a:p>
@@ -2089,7 +2192,7 @@
           <a:p>
             <a:fld id="{5E7C8677-3CB4-8D4B-92CE-473270A12EDD}" type="datetimeFigureOut">
               <a:rPr lang="en-US" smtClean="0"/>
-              <a:t>10/8/25</a:t>
+              <a:t>10/17/25</a:t>
             </a:fld>
             <a:endParaRPr lang="en-US"/>
           </a:p>
@@ -2402,7 +2505,7 @@
           <a:p>
             <a:fld id="{5E7C8677-3CB4-8D4B-92CE-473270A12EDD}" type="datetimeFigureOut">
               <a:rPr lang="en-US" smtClean="0"/>
-              <a:t>10/8/25</a:t>
+              <a:t>10/17/25</a:t>
             </a:fld>
             <a:endParaRPr lang="en-US"/>
           </a:p>
@@ -2691,7 +2794,7 @@
           <a:p>
             <a:fld id="{5E7C8677-3CB4-8D4B-92CE-473270A12EDD}" type="datetimeFigureOut">
               <a:rPr lang="en-US" smtClean="0"/>
-              <a:t>10/8/25</a:t>
+              <a:t>10/17/25</a:t>
             </a:fld>
             <a:endParaRPr lang="en-US"/>
           </a:p>
@@ -2934,7 +3037,7 @@
           <a:p>
             <a:fld id="{5E7C8677-3CB4-8D4B-92CE-473270A12EDD}" type="datetimeFigureOut">
               <a:rPr lang="en-US" smtClean="0"/>
-              <a:t>10/8/25</a:t>
+              <a:t>10/17/25</a:t>
             </a:fld>
             <a:endParaRPr lang="en-US"/>
           </a:p>
@@ -3373,7 +3476,11 @@
           <a:lstStyle/>
           <a:p>
             <a:r>
-              <a:rPr lang="en-US" dirty="0"/>
+              <a:rPr lang="en-US" dirty="0">
+                <a:latin typeface="Menlo" panose="020B0609030804020204" pitchFamily="49" charset="0"/>
+                <a:ea typeface="Menlo" panose="020B0609030804020204" pitchFamily="49" charset="0"/>
+                <a:cs typeface="Menlo" panose="020B0609030804020204" pitchFamily="49" charset="0"/>
+              </a:rPr>
               <a:t>Viewport</a:t>
             </a:r>
           </a:p>
@@ -3401,7 +3508,11 @@
           <a:lstStyle/>
           <a:p>
             <a:r>
-              <a:rPr lang="en-US" dirty="0"/>
+              <a:rPr lang="en-US" dirty="0">
+                <a:latin typeface="Menlo" panose="020B0609030804020204" pitchFamily="49" charset="0"/>
+                <a:ea typeface="Menlo" panose="020B0609030804020204" pitchFamily="49" charset="0"/>
+                <a:cs typeface="Menlo" panose="020B0609030804020204" pitchFamily="49" charset="0"/>
+              </a:rPr>
               <a:t>Elliott Denis</a:t>
             </a:r>
           </a:p>
@@ -3606,7 +3717,11 @@
           <a:lstStyle/>
           <a:p>
             <a:r>
-              <a:rPr lang="en-US" dirty="0"/>
+              <a:rPr lang="en-US" dirty="0">
+                <a:latin typeface="Menlo" panose="020B0609030804020204" pitchFamily="49" charset="0"/>
+                <a:ea typeface="Menlo" panose="020B0609030804020204" pitchFamily="49" charset="0"/>
+                <a:cs typeface="Menlo" panose="020B0609030804020204" pitchFamily="49" charset="0"/>
+              </a:rPr>
               <a:t>Origin story	</a:t>
             </a:r>
           </a:p>
@@ -3628,13 +3743,22 @@
             <p:ph idx="1"/>
           </p:nvPr>
         </p:nvSpPr>
-        <p:spPr/>
-        <p:txBody>
-          <a:bodyPr/>
-          <a:lstStyle/>
-          <a:p>
-            <a:r>
-              <a:rPr lang="en-US" dirty="0"/>
+        <p:spPr>
+          <a:xfrm>
+            <a:off x="838200" y="2023413"/>
+            <a:ext cx="10515600" cy="3955762"/>
+          </a:xfrm>
+        </p:spPr>
+        <p:txBody>
+          <a:bodyPr/>
+          <a:lstStyle/>
+          <a:p>
+            <a:r>
+              <a:rPr lang="en-US" dirty="0">
+                <a:latin typeface="Menlo" panose="020B0609030804020204" pitchFamily="49" charset="0"/>
+                <a:ea typeface="Menlo" panose="020B0609030804020204" pitchFamily="49" charset="0"/>
+                <a:cs typeface="Menlo" panose="020B0609030804020204" pitchFamily="49" charset="0"/>
+              </a:rPr>
               <a:t>All from call with virgin media</a:t>
             </a:r>
           </a:p>
@@ -3692,7 +3816,11 @@
           <a:lstStyle/>
           <a:p>
             <a:r>
-              <a:rPr lang="en-US" dirty="0"/>
+              <a:rPr lang="en-US" dirty="0">
+                <a:latin typeface="Menlo" panose="020B0609030804020204" pitchFamily="49" charset="0"/>
+                <a:ea typeface="Menlo" panose="020B0609030804020204" pitchFamily="49" charset="0"/>
+                <a:cs typeface="Menlo" panose="020B0609030804020204" pitchFamily="49" charset="0"/>
+              </a:rPr>
               <a:t>Resulting applications</a:t>
             </a:r>
           </a:p>
@@ -3719,7 +3847,19 @@
           <a:bodyPr/>
           <a:lstStyle/>
           <a:p>
-            <a:endParaRPr lang="en-US"/>
+            <a:r>
+              <a:rPr lang="en-US" dirty="0" err="1">
+                <a:latin typeface="Menlo" panose="020B0609030804020204" pitchFamily="49" charset="0"/>
+                <a:ea typeface="Menlo" panose="020B0609030804020204" pitchFamily="49" charset="0"/>
+                <a:cs typeface="Menlo" panose="020B0609030804020204" pitchFamily="49" charset="0"/>
+              </a:rPr>
+              <a:t>eee</a:t>
+            </a:r>
+            <a:endParaRPr lang="en-US" dirty="0">
+              <a:latin typeface="Menlo" panose="020B0609030804020204" pitchFamily="49" charset="0"/>
+              <a:ea typeface="Menlo" panose="020B0609030804020204" pitchFamily="49" charset="0"/>
+              <a:cs typeface="Menlo" panose="020B0609030804020204" pitchFamily="49" charset="0"/>
+            </a:endParaRPr>
           </a:p>
         </p:txBody>
       </p:sp>
@@ -3775,7 +3915,11 @@
           <a:lstStyle/>
           <a:p>
             <a:r>
-              <a:rPr lang="en-US" dirty="0"/>
+              <a:rPr lang="en-US" dirty="0">
+                <a:latin typeface="Menlo" panose="020B0609030804020204" pitchFamily="49" charset="0"/>
+                <a:ea typeface="Menlo" panose="020B0609030804020204" pitchFamily="49" charset="0"/>
+                <a:cs typeface="Menlo" panose="020B0609030804020204" pitchFamily="49" charset="0"/>
+              </a:rPr>
               <a:t>Name of company</a:t>
             </a:r>
           </a:p>

</xml_diff>

<commit_message>
can now signingit add .
</commit_message>
<xml_diff>
--- a/Viewport - Design Ideas.pptx
+++ b/Viewport - Design Ideas.pptx
@@ -121,23 +121,31 @@
 </p:presentation>
 </file>
 
+<file path=ppt/revisionInfo.xml><?xml version="1.0" encoding="utf-8"?>
+<p1510:revInfo xmlns:a="http://schemas.openxmlformats.org/drawingml/2006/main" xmlns:r="http://schemas.openxmlformats.org/officeDocument/2006/relationships" xmlns:p1510="http://schemas.microsoft.com/office/powerpoint/2015/10/main">
+  <p1510:revLst>
+    <p1510:client id="{7BDE861C-E36D-DF4E-AC96-7E06FC79DD02}" v="3" dt="2025-10-17T02:25:58.231"/>
+  </p1510:revLst>
+</p1510:revInfo>
+</file>
+
 <file path=ppt/changesInfos/changesInfo1.xml><?xml version="1.0" encoding="utf-8"?>
 <pc:chgInfo xmlns:a="http://schemas.openxmlformats.org/drawingml/2006/main" xmlns:r="http://schemas.openxmlformats.org/officeDocument/2006/relationships" xmlns:ac="http://schemas.microsoft.com/office/drawing/2013/main/command" xmlns:pc="http://schemas.microsoft.com/office/powerpoint/2013/main/command">
   <pc:docChgLst>
     <pc:chgData name="Elliott Denis" userId="95ca5700b14b8956" providerId="LiveId" clId="{7BDE861C-E36D-DF4E-AC96-7E06FC79DD02}"/>
-    <pc:docChg chg="modSld">
-      <pc:chgData name="Elliott Denis" userId="95ca5700b14b8956" providerId="LiveId" clId="{7BDE861C-E36D-DF4E-AC96-7E06FC79DD02}" dt="2025-10-17T02:00:01.467" v="16" actId="20577"/>
+    <pc:docChg chg="undo redo custSel modSld">
+      <pc:chgData name="Elliott Denis" userId="95ca5700b14b8956" providerId="LiveId" clId="{7BDE861C-E36D-DF4E-AC96-7E06FC79DD02}" dt="2025-10-17T02:25:58.534" v="57" actId="26606"/>
       <pc:docMkLst>
         <pc:docMk/>
       </pc:docMkLst>
-      <pc:sldChg chg="modSp mod">
-        <pc:chgData name="Elliott Denis" userId="95ca5700b14b8956" providerId="LiveId" clId="{7BDE861C-E36D-DF4E-AC96-7E06FC79DD02}" dt="2025-10-17T01:54:45.825" v="1" actId="2711"/>
+      <pc:sldChg chg="addSp delSp modSp mod setBg">
+        <pc:chgData name="Elliott Denis" userId="95ca5700b14b8956" providerId="LiveId" clId="{7BDE861C-E36D-DF4E-AC96-7E06FC79DD02}" dt="2025-10-17T02:25:58.534" v="57" actId="26606"/>
         <pc:sldMkLst>
           <pc:docMk/>
           <pc:sldMk cId="1725448342" sldId="256"/>
         </pc:sldMkLst>
         <pc:spChg chg="mod">
-          <ac:chgData name="Elliott Denis" userId="95ca5700b14b8956" providerId="LiveId" clId="{7BDE861C-E36D-DF4E-AC96-7E06FC79DD02}" dt="2025-10-17T01:54:39.896" v="0" actId="2711"/>
+          <ac:chgData name="Elliott Denis" userId="95ca5700b14b8956" providerId="LiveId" clId="{7BDE861C-E36D-DF4E-AC96-7E06FC79DD02}" dt="2025-10-17T02:25:58.534" v="57" actId="26606"/>
           <ac:spMkLst>
             <pc:docMk/>
             <pc:sldMk cId="1725448342" sldId="256"/>
@@ -145,37 +153,149 @@
           </ac:spMkLst>
         </pc:spChg>
         <pc:spChg chg="mod">
-          <ac:chgData name="Elliott Denis" userId="95ca5700b14b8956" providerId="LiveId" clId="{7BDE861C-E36D-DF4E-AC96-7E06FC79DD02}" dt="2025-10-17T01:54:45.825" v="1" actId="2711"/>
+          <ac:chgData name="Elliott Denis" userId="95ca5700b14b8956" providerId="LiveId" clId="{7BDE861C-E36D-DF4E-AC96-7E06FC79DD02}" dt="2025-10-17T02:25:58.534" v="57" actId="26606"/>
           <ac:spMkLst>
             <pc:docMk/>
             <pc:sldMk cId="1725448342" sldId="256"/>
             <ac:spMk id="3" creationId="{0A4E5B51-48BD-6E5F-6708-ABF5A64D5308}"/>
           </ac:spMkLst>
         </pc:spChg>
+        <pc:spChg chg="add del">
+          <ac:chgData name="Elliott Denis" userId="95ca5700b14b8956" providerId="LiveId" clId="{7BDE861C-E36D-DF4E-AC96-7E06FC79DD02}" dt="2025-10-17T02:24:39.164" v="23" actId="26606"/>
+          <ac:spMkLst>
+            <pc:docMk/>
+            <pc:sldMk cId="1725448342" sldId="256"/>
+            <ac:spMk id="10" creationId="{3C54F4CE-85F0-46ED-80DA-9518C9251AD1}"/>
+          </ac:spMkLst>
+        </pc:spChg>
+        <pc:spChg chg="add del">
+          <ac:chgData name="Elliott Denis" userId="95ca5700b14b8956" providerId="LiveId" clId="{7BDE861C-E36D-DF4E-AC96-7E06FC79DD02}" dt="2025-10-17T02:25:58.534" v="57" actId="26606"/>
+          <ac:spMkLst>
+            <pc:docMk/>
+            <pc:sldMk cId="1725448342" sldId="256"/>
+            <ac:spMk id="10" creationId="{DF05ACD0-FF4A-4F8F-B5C5-6A4EBD0D1B38}"/>
+          </ac:spMkLst>
+        </pc:spChg>
+        <pc:spChg chg="add del">
+          <ac:chgData name="Elliott Denis" userId="95ca5700b14b8956" providerId="LiveId" clId="{7BDE861C-E36D-DF4E-AC96-7E06FC79DD02}" dt="2025-10-17T02:25:58.534" v="57" actId="26606"/>
+          <ac:spMkLst>
+            <pc:docMk/>
+            <pc:sldMk cId="1725448342" sldId="256"/>
+            <ac:spMk id="12" creationId="{4C9AFA28-B5ED-4346-9AF7-68A157F16C7E}"/>
+          </ac:spMkLst>
+        </pc:spChg>
+        <pc:spChg chg="add del">
+          <ac:chgData name="Elliott Denis" userId="95ca5700b14b8956" providerId="LiveId" clId="{7BDE861C-E36D-DF4E-AC96-7E06FC79DD02}" dt="2025-10-17T02:24:39.164" v="23" actId="26606"/>
+          <ac:spMkLst>
+            <pc:docMk/>
+            <pc:sldMk cId="1725448342" sldId="256"/>
+            <ac:spMk id="12" creationId="{DADD1FCA-8ACB-4958-81DD-4CDD6D3E1921}"/>
+          </ac:spMkLst>
+        </pc:spChg>
+        <pc:spChg chg="add del">
+          <ac:chgData name="Elliott Denis" userId="95ca5700b14b8956" providerId="LiveId" clId="{7BDE861C-E36D-DF4E-AC96-7E06FC79DD02}" dt="2025-10-17T02:25:50.890" v="37" actId="26606"/>
+          <ac:spMkLst>
+            <pc:docMk/>
+            <pc:sldMk cId="1725448342" sldId="256"/>
+            <ac:spMk id="17" creationId="{B7BD7FCF-A254-4A97-A15C-319B67622677}"/>
+          </ac:spMkLst>
+        </pc:spChg>
+        <pc:spChg chg="add del">
+          <ac:chgData name="Elliott Denis" userId="95ca5700b14b8956" providerId="LiveId" clId="{7BDE861C-E36D-DF4E-AC96-7E06FC79DD02}" dt="2025-10-17T02:25:50.890" v="37" actId="26606"/>
+          <ac:spMkLst>
+            <pc:docMk/>
+            <pc:sldMk cId="1725448342" sldId="256"/>
+            <ac:spMk id="19" creationId="{52FFAF72-6204-4676-9C6F-9A4CC4D91805}"/>
+          </ac:spMkLst>
+        </pc:spChg>
+        <pc:picChg chg="add del mod">
+          <ac:chgData name="Elliott Denis" userId="95ca5700b14b8956" providerId="LiveId" clId="{7BDE861C-E36D-DF4E-AC96-7E06FC79DD02}" dt="2025-10-17T02:25:58.534" v="57" actId="26606"/>
+          <ac:picMkLst>
+            <pc:docMk/>
+            <pc:sldMk cId="1725448342" sldId="256"/>
+            <ac:picMk id="5" creationId="{CE9F4C9C-792A-541F-A298-C78A17C00307}"/>
+          </ac:picMkLst>
+        </pc:picChg>
       </pc:sldChg>
-      <pc:sldChg chg="modSp mod">
-        <pc:chgData name="Elliott Denis" userId="95ca5700b14b8956" providerId="LiveId" clId="{7BDE861C-E36D-DF4E-AC96-7E06FC79DD02}" dt="2025-10-17T01:55:27.127" v="10" actId="2711"/>
+      <pc:sldChg chg="addSp delSp modSp mod setBg">
+        <pc:chgData name="Elliott Denis" userId="95ca5700b14b8956" providerId="LiveId" clId="{7BDE861C-E36D-DF4E-AC96-7E06FC79DD02}" dt="2025-10-17T02:25:56.187" v="52" actId="2711"/>
         <pc:sldMkLst>
           <pc:docMk/>
           <pc:sldMk cId="2134986430" sldId="258"/>
         </pc:sldMkLst>
         <pc:spChg chg="mod">
-          <ac:chgData name="Elliott Denis" userId="95ca5700b14b8956" providerId="LiveId" clId="{7BDE861C-E36D-DF4E-AC96-7E06FC79DD02}" dt="2025-10-17T01:55:27.127" v="10" actId="2711"/>
+          <ac:chgData name="Elliott Denis" userId="95ca5700b14b8956" providerId="LiveId" clId="{7BDE861C-E36D-DF4E-AC96-7E06FC79DD02}" dt="2025-10-17T02:25:56.187" v="52" actId="2711"/>
           <ac:spMkLst>
             <pc:docMk/>
             <pc:sldMk cId="2134986430" sldId="258"/>
             <ac:spMk id="2" creationId="{D45FBAA6-EBB6-0850-469E-D2A2D250A7F8}"/>
           </ac:spMkLst>
         </pc:spChg>
+        <pc:spChg chg="mod">
+          <ac:chgData name="Elliott Denis" userId="95ca5700b14b8956" providerId="LiveId" clId="{7BDE861C-E36D-DF4E-AC96-7E06FC79DD02}" dt="2025-10-17T02:25:49.681" v="32" actId="26606"/>
+          <ac:spMkLst>
+            <pc:docMk/>
+            <pc:sldMk cId="2134986430" sldId="258"/>
+            <ac:spMk id="3" creationId="{C655C0F7-BE41-B25B-7D75-EAD16809AD56}"/>
+          </ac:spMkLst>
+        </pc:spChg>
+        <pc:spChg chg="add del">
+          <ac:chgData name="Elliott Denis" userId="95ca5700b14b8956" providerId="LiveId" clId="{7BDE861C-E36D-DF4E-AC96-7E06FC79DD02}" dt="2025-10-17T02:25:49.681" v="32" actId="26606"/>
+          <ac:spMkLst>
+            <pc:docMk/>
+            <pc:sldMk cId="2134986430" sldId="258"/>
+            <ac:spMk id="8" creationId="{327D73B4-9F5C-4A64-A179-51B9500CB8B5}"/>
+          </ac:spMkLst>
+        </pc:spChg>
+        <pc:spChg chg="add del">
+          <ac:chgData name="Elliott Denis" userId="95ca5700b14b8956" providerId="LiveId" clId="{7BDE861C-E36D-DF4E-AC96-7E06FC79DD02}" dt="2025-10-17T02:25:49.681" v="32" actId="26606"/>
+          <ac:spMkLst>
+            <pc:docMk/>
+            <pc:sldMk cId="2134986430" sldId="258"/>
+            <ac:spMk id="10" creationId="{C1F06963-6374-4B48-844F-071A9BAAAE02}"/>
+          </ac:spMkLst>
+        </pc:spChg>
+        <pc:spChg chg="add del">
+          <ac:chgData name="Elliott Denis" userId="95ca5700b14b8956" providerId="LiveId" clId="{7BDE861C-E36D-DF4E-AC96-7E06FC79DD02}" dt="2025-10-17T02:25:49.681" v="32" actId="26606"/>
+          <ac:spMkLst>
+            <pc:docMk/>
+            <pc:sldMk cId="2134986430" sldId="258"/>
+            <ac:spMk id="12" creationId="{6CB927A4-E432-4310-9CD5-E89FF5063179}"/>
+          </ac:spMkLst>
+        </pc:spChg>
+        <pc:spChg chg="add del">
+          <ac:chgData name="Elliott Denis" userId="95ca5700b14b8956" providerId="LiveId" clId="{7BDE861C-E36D-DF4E-AC96-7E06FC79DD02}" dt="2025-10-17T02:25:49.681" v="32" actId="26606"/>
+          <ac:spMkLst>
+            <pc:docMk/>
+            <pc:sldMk cId="2134986430" sldId="258"/>
+            <ac:spMk id="14" creationId="{1453BF6C-B012-48B7-B4E8-6D7AC7C27D02}"/>
+          </ac:spMkLst>
+        </pc:spChg>
+        <pc:spChg chg="add del">
+          <ac:chgData name="Elliott Denis" userId="95ca5700b14b8956" providerId="LiveId" clId="{7BDE861C-E36D-DF4E-AC96-7E06FC79DD02}" dt="2025-10-17T02:25:49.681" v="32" actId="26606"/>
+          <ac:spMkLst>
+            <pc:docMk/>
+            <pc:sldMk cId="2134986430" sldId="258"/>
+            <ac:spMk id="16" creationId="{E3020543-B24B-4EC4-8FFC-8DD88EEA91A8}"/>
+          </ac:spMkLst>
+        </pc:spChg>
+        <pc:cxnChg chg="add del">
+          <ac:chgData name="Elliott Denis" userId="95ca5700b14b8956" providerId="LiveId" clId="{7BDE861C-E36D-DF4E-AC96-7E06FC79DD02}" dt="2025-10-17T02:25:49.681" v="32" actId="26606"/>
+          <ac:cxnSpMkLst>
+            <pc:docMk/>
+            <pc:sldMk cId="2134986430" sldId="258"/>
+            <ac:cxnSpMk id="18" creationId="{C49DA8F6-BCC1-4447-B54C-57856834B94B}"/>
+          </ac:cxnSpMkLst>
+        </pc:cxnChg>
       </pc:sldChg>
-      <pc:sldChg chg="modSp mod">
-        <pc:chgData name="Elliott Denis" userId="95ca5700b14b8956" providerId="LiveId" clId="{7BDE861C-E36D-DF4E-AC96-7E06FC79DD02}" dt="2025-10-17T02:00:01.467" v="16" actId="20577"/>
+      <pc:sldChg chg="addSp delSp modSp mod setBg">
+        <pc:chgData name="Elliott Denis" userId="95ca5700b14b8956" providerId="LiveId" clId="{7BDE861C-E36D-DF4E-AC96-7E06FC79DD02}" dt="2025-10-17T02:25:57.756" v="54" actId="20577"/>
         <pc:sldMkLst>
           <pc:docMk/>
           <pc:sldMk cId="1680014664" sldId="262"/>
         </pc:sldMkLst>
         <pc:spChg chg="mod">
-          <ac:chgData name="Elliott Denis" userId="95ca5700b14b8956" providerId="LiveId" clId="{7BDE861C-E36D-DF4E-AC96-7E06FC79DD02}" dt="2025-10-17T01:54:55.444" v="2" actId="2711"/>
+          <ac:chgData name="Elliott Denis" userId="95ca5700b14b8956" providerId="LiveId" clId="{7BDE861C-E36D-DF4E-AC96-7E06FC79DD02}" dt="2025-10-17T02:25:50.763" v="36" actId="26606"/>
           <ac:spMkLst>
             <pc:docMk/>
             <pc:sldMk cId="1680014664" sldId="262"/>
@@ -183,22 +303,38 @@
           </ac:spMkLst>
         </pc:spChg>
         <pc:spChg chg="mod">
-          <ac:chgData name="Elliott Denis" userId="95ca5700b14b8956" providerId="LiveId" clId="{7BDE861C-E36D-DF4E-AC96-7E06FC79DD02}" dt="2025-10-17T02:00:01.467" v="16" actId="20577"/>
+          <ac:chgData name="Elliott Denis" userId="95ca5700b14b8956" providerId="LiveId" clId="{7BDE861C-E36D-DF4E-AC96-7E06FC79DD02}" dt="2025-10-17T02:25:57.756" v="54" actId="20577"/>
           <ac:spMkLst>
             <pc:docMk/>
             <pc:sldMk cId="1680014664" sldId="262"/>
             <ac:spMk id="3" creationId="{0E7B9107-059C-4F8B-D20A-4125EFD7B3BF}"/>
           </ac:spMkLst>
         </pc:spChg>
+        <pc:spChg chg="add del">
+          <ac:chgData name="Elliott Denis" userId="95ca5700b14b8956" providerId="LiveId" clId="{7BDE861C-E36D-DF4E-AC96-7E06FC79DD02}" dt="2025-10-17T02:25:50.763" v="36" actId="26606"/>
+          <ac:spMkLst>
+            <pc:docMk/>
+            <pc:sldMk cId="1680014664" sldId="262"/>
+            <ac:spMk id="8" creationId="{5E7AA7E8-8006-4E1F-A566-FCF37EE6F35D}"/>
+          </ac:spMkLst>
+        </pc:spChg>
+        <pc:cxnChg chg="add del">
+          <ac:chgData name="Elliott Denis" userId="95ca5700b14b8956" providerId="LiveId" clId="{7BDE861C-E36D-DF4E-AC96-7E06FC79DD02}" dt="2025-10-17T02:25:50.763" v="36" actId="26606"/>
+          <ac:cxnSpMkLst>
+            <pc:docMk/>
+            <pc:sldMk cId="1680014664" sldId="262"/>
+            <ac:cxnSpMk id="10" creationId="{56020367-4FD5-4596-8E10-C5F095CD8DBF}"/>
+          </ac:cxnSpMkLst>
+        </pc:cxnChg>
       </pc:sldChg>
-      <pc:sldChg chg="modSp mod">
-        <pc:chgData name="Elliott Denis" userId="95ca5700b14b8956" providerId="LiveId" clId="{7BDE861C-E36D-DF4E-AC96-7E06FC79DD02}" dt="2025-10-17T01:55:22.698" v="9" actId="20577"/>
+      <pc:sldChg chg="addSp delSp modSp mod setBg addAnim delAnim">
+        <pc:chgData name="Elliott Denis" userId="95ca5700b14b8956" providerId="LiveId" clId="{7BDE861C-E36D-DF4E-AC96-7E06FC79DD02}" dt="2025-10-17T02:25:55.859" v="51" actId="20577"/>
         <pc:sldMkLst>
           <pc:docMk/>
           <pc:sldMk cId="4108944765" sldId="263"/>
         </pc:sldMkLst>
         <pc:spChg chg="mod">
-          <ac:chgData name="Elliott Denis" userId="95ca5700b14b8956" providerId="LiveId" clId="{7BDE861C-E36D-DF4E-AC96-7E06FC79DD02}" dt="2025-10-17T01:55:17.232" v="5" actId="2711"/>
+          <ac:chgData name="Elliott Denis" userId="95ca5700b14b8956" providerId="LiveId" clId="{7BDE861C-E36D-DF4E-AC96-7E06FC79DD02}" dt="2025-10-17T02:25:55.525" v="49" actId="2711"/>
           <ac:spMkLst>
             <pc:docMk/>
             <pc:sldMk cId="4108944765" sldId="263"/>
@@ -206,13 +342,29 @@
           </ac:spMkLst>
         </pc:spChg>
         <pc:spChg chg="mod">
-          <ac:chgData name="Elliott Denis" userId="95ca5700b14b8956" providerId="LiveId" clId="{7BDE861C-E36D-DF4E-AC96-7E06FC79DD02}" dt="2025-10-17T01:55:22.698" v="9" actId="20577"/>
+          <ac:chgData name="Elliott Denis" userId="95ca5700b14b8956" providerId="LiveId" clId="{7BDE861C-E36D-DF4E-AC96-7E06FC79DD02}" dt="2025-10-17T02:25:55.859" v="51" actId="20577"/>
           <ac:spMkLst>
             <pc:docMk/>
             <pc:sldMk cId="4108944765" sldId="263"/>
             <ac:spMk id="3" creationId="{F4E1F9C9-58C9-815C-0E43-EE2E4BCFD0BA}"/>
           </ac:spMkLst>
         </pc:spChg>
+        <pc:spChg chg="add del">
+          <ac:chgData name="Elliott Denis" userId="95ca5700b14b8956" providerId="LiveId" clId="{7BDE861C-E36D-DF4E-AC96-7E06FC79DD02}" dt="2025-10-17T02:25:50.019" v="33" actId="26606"/>
+          <ac:spMkLst>
+            <pc:docMk/>
+            <pc:sldMk cId="4108944765" sldId="263"/>
+            <ac:spMk id="8" creationId="{5E7AA7E8-8006-4E1F-A566-FCF37EE6F35D}"/>
+          </ac:spMkLst>
+        </pc:spChg>
+        <pc:cxnChg chg="add del">
+          <ac:chgData name="Elliott Denis" userId="95ca5700b14b8956" providerId="LiveId" clId="{7BDE861C-E36D-DF4E-AC96-7E06FC79DD02}" dt="2025-10-17T02:25:50.019" v="33" actId="26606"/>
+          <ac:cxnSpMkLst>
+            <pc:docMk/>
+            <pc:sldMk cId="4108944765" sldId="263"/>
+            <ac:cxnSpMk id="10" creationId="{56020367-4FD5-4596-8E10-C5F095CD8DBF}"/>
+          </ac:cxnSpMkLst>
+        </pc:cxnChg>
       </pc:sldChg>
     </pc:docChg>
   </pc:docChgLst>
@@ -3440,6 +3592,14 @@
 <file path=ppt/slides/slide1.xml><?xml version="1.0" encoding="utf-8"?>
 <p:sld xmlns:a="http://schemas.openxmlformats.org/drawingml/2006/main" xmlns:r="http://schemas.openxmlformats.org/officeDocument/2006/relationships" xmlns:p="http://schemas.openxmlformats.org/presentationml/2006/main">
   <p:cSld>
+    <p:bg>
+      <p:bgPr>
+        <a:solidFill>
+          <a:schemeClr val="bg1"/>
+        </a:solidFill>
+        <a:effectLst/>
+      </p:bgPr>
+    </p:bg>
     <p:spTree>
       <p:nvGrpSpPr>
         <p:cNvPr id="1" name=""/>
@@ -3454,6 +3614,152 @@
           <a:chExt cx="0" cy="0"/>
         </a:xfrm>
       </p:grpSpPr>
+      <p:sp useBgFill="1">
+        <p:nvSpPr>
+          <p:cNvPr id="10" name="Rectangle 9">
+            <a:extLst>
+              <a:ext uri="{FF2B5EF4-FFF2-40B4-BE49-F238E27FC236}">
+                <a16:creationId xmlns:a16="http://schemas.microsoft.com/office/drawing/2014/main" id="{DF05ACD0-FF4A-4F8F-B5C5-6A4EBD0D1B38}"/>
+              </a:ext>
+              <a:ext uri="{C183D7F6-B498-43B3-948B-1728B52AA6E4}">
+                <adec:decorative xmlns:adec="http://schemas.microsoft.com/office/drawing/2017/decorative" val="1"/>
+              </a:ext>
+            </a:extLst>
+          </p:cNvPr>
+          <p:cNvSpPr>
+            <a:spLocks noGrp="1" noRot="1" noChangeAspect="1" noMove="1" noResize="1" noEditPoints="1" noAdjustHandles="1" noChangeArrowheads="1" noChangeShapeType="1" noTextEdit="1"/>
+          </p:cNvSpPr>
+          <p:nvPr>
+            <p:extLst>
+              <p:ext uri="{386F3935-93C4-4BCD-93E2-E3B085C9AB24}">
+                <p16:designElem xmlns:p16="http://schemas.microsoft.com/office/powerpoint/2015/main" val="1"/>
+              </p:ext>
+            </p:extLst>
+          </p:nvPr>
+        </p:nvSpPr>
+        <p:spPr>
+          <a:xfrm>
+            <a:off x="0" y="0"/>
+            <a:ext cx="12192000" cy="6858000"/>
+          </a:xfrm>
+          <a:prstGeom prst="rect">
+            <a:avLst/>
+          </a:prstGeom>
+          <a:ln w="12700" cap="flat" cmpd="sng" algn="ctr">
+            <a:noFill/>
+            <a:prstDash val="solid"/>
+            <a:miter lim="800000"/>
+          </a:ln>
+          <a:effectLst/>
+          <a:extLst>
+            <a:ext uri="{91240B29-F687-4F45-9708-019B960494DF}">
+              <a14:hiddenLine xmlns:a14="http://schemas.microsoft.com/office/drawing/2010/main" w="12700" cap="flat" cmpd="sng" algn="ctr">
+                <a:solidFill>
+                  <a:schemeClr val="accent1">
+                    <a:shade val="50000"/>
+                  </a:schemeClr>
+                </a:solidFill>
+                <a:prstDash val="solid"/>
+                <a:miter lim="800000"/>
+              </a14:hiddenLine>
+            </a:ext>
+          </a:extLst>
+        </p:spPr>
+        <p:style>
+          <a:lnRef idx="2">
+            <a:schemeClr val="accent1">
+              <a:shade val="50000"/>
+            </a:schemeClr>
+          </a:lnRef>
+          <a:fillRef idx="1">
+            <a:schemeClr val="accent1"/>
+          </a:fillRef>
+          <a:effectRef idx="0">
+            <a:schemeClr val="accent1"/>
+          </a:effectRef>
+          <a:fontRef idx="minor">
+            <a:schemeClr val="lt1"/>
+          </a:fontRef>
+        </p:style>
+        <p:txBody>
+          <a:bodyPr rtlCol="0" anchor="ctr"/>
+          <a:lstStyle/>
+          <a:p>
+            <a:pPr algn="ctr"/>
+            <a:endParaRPr lang="en-US"/>
+          </a:p>
+        </p:txBody>
+      </p:sp>
+      <p:sp>
+        <p:nvSpPr>
+          <p:cNvPr id="12" name="Rectangle 11">
+            <a:extLst>
+              <a:ext uri="{FF2B5EF4-FFF2-40B4-BE49-F238E27FC236}">
+                <a16:creationId xmlns:a16="http://schemas.microsoft.com/office/drawing/2014/main" id="{4C9AFA28-B5ED-4346-9AF7-68A157F16C7E}"/>
+              </a:ext>
+              <a:ext uri="{C183D7F6-B498-43B3-948B-1728B52AA6E4}">
+                <adec:decorative xmlns:adec="http://schemas.microsoft.com/office/drawing/2017/decorative" val="1"/>
+              </a:ext>
+            </a:extLst>
+          </p:cNvPr>
+          <p:cNvSpPr>
+            <a:spLocks noGrp="1" noRot="1" noChangeAspect="1" noMove="1" noResize="1" noEditPoints="1" noAdjustHandles="1" noChangeArrowheads="1" noChangeShapeType="1" noTextEdit="1"/>
+          </p:cNvSpPr>
+          <p:nvPr>
+            <p:extLst>
+              <p:ext uri="{386F3935-93C4-4BCD-93E2-E3B085C9AB24}">
+                <p16:designElem xmlns:p16="http://schemas.microsoft.com/office/powerpoint/2015/main" val="1"/>
+              </p:ext>
+            </p:extLst>
+          </p:nvPr>
+        </p:nvSpPr>
+        <p:spPr>
+          <a:xfrm>
+            <a:off x="685800" y="685800"/>
+            <a:ext cx="10820400" cy="5486400"/>
+          </a:xfrm>
+          <a:prstGeom prst="rect">
+            <a:avLst/>
+          </a:prstGeom>
+          <a:solidFill>
+            <a:schemeClr val="accent2">
+              <a:lumMod val="20000"/>
+              <a:lumOff val="80000"/>
+            </a:schemeClr>
+          </a:solidFill>
+          <a:ln>
+            <a:noFill/>
+          </a:ln>
+        </p:spPr>
+        <p:style>
+          <a:lnRef idx="2">
+            <a:schemeClr val="accent1">
+              <a:shade val="50000"/>
+            </a:schemeClr>
+          </a:lnRef>
+          <a:fillRef idx="1">
+            <a:schemeClr val="accent1"/>
+          </a:fillRef>
+          <a:effectRef idx="0">
+            <a:schemeClr val="accent1"/>
+          </a:effectRef>
+          <a:fontRef idx="minor">
+            <a:schemeClr val="lt1"/>
+          </a:fontRef>
+        </p:style>
+        <p:txBody>
+          <a:bodyPr rtlCol="0" anchor="ctr"/>
+          <a:lstStyle/>
+          <a:p>
+            <a:pPr algn="ctr"/>
+            <a:endParaRPr lang="en-US">
+              <a:solidFill>
+                <a:schemeClr val="bg2"/>
+              </a:solidFill>
+            </a:endParaRPr>
+          </a:p>
+        </p:txBody>
+      </p:sp>
       <p:sp>
         <p:nvSpPr>
           <p:cNvPr id="2" name="Title 1">
@@ -3470,13 +3776,23 @@
             <p:ph type="ctrTitle"/>
           </p:nvPr>
         </p:nvSpPr>
-        <p:spPr/>
-        <p:txBody>
-          <a:bodyPr/>
-          <a:lstStyle/>
-          <a:p>
-            <a:r>
-              <a:rPr lang="en-US" dirty="0">
+        <p:spPr>
+          <a:xfrm>
+            <a:off x="1472608" y="1380564"/>
+            <a:ext cx="4561369" cy="2346229"/>
+          </a:xfrm>
+        </p:spPr>
+        <p:txBody>
+          <a:bodyPr anchor="b">
+            <a:normAutofit/>
+          </a:bodyPr>
+          <a:lstStyle/>
+          <a:p>
+            <a:r>
+              <a:rPr lang="en-US" sz="3200">
+                <a:solidFill>
+                  <a:srgbClr val="595959"/>
+                </a:solidFill>
                 <a:latin typeface="Menlo" panose="020B0609030804020204" pitchFamily="49" charset="0"/>
                 <a:ea typeface="Menlo" panose="020B0609030804020204" pitchFamily="49" charset="0"/>
                 <a:cs typeface="Menlo" panose="020B0609030804020204" pitchFamily="49" charset="0"/>
@@ -3502,13 +3818,23 @@
             <p:ph type="subTitle" idx="1"/>
           </p:nvPr>
         </p:nvSpPr>
-        <p:spPr/>
-        <p:txBody>
-          <a:bodyPr/>
-          <a:lstStyle/>
-          <a:p>
-            <a:r>
-              <a:rPr lang="en-US" dirty="0">
+        <p:spPr>
+          <a:xfrm>
+            <a:off x="1472608" y="4061345"/>
+            <a:ext cx="4561369" cy="1416090"/>
+          </a:xfrm>
+        </p:spPr>
+        <p:txBody>
+          <a:bodyPr anchor="t">
+            <a:normAutofit/>
+          </a:bodyPr>
+          <a:lstStyle/>
+          <a:p>
+            <a:r>
+              <a:rPr lang="en-US" sz="1400">
+                <a:solidFill>
+                  <a:srgbClr val="595959"/>
+                </a:solidFill>
                 <a:latin typeface="Menlo" panose="020B0609030804020204" pitchFamily="49" charset="0"/>
                 <a:ea typeface="Menlo" panose="020B0609030804020204" pitchFamily="49" charset="0"/>
                 <a:cs typeface="Menlo" panose="020B0609030804020204" pitchFamily="49" charset="0"/>
@@ -3518,6 +3844,36 @@
           </a:p>
         </p:txBody>
       </p:sp>
+      <p:pic>
+        <p:nvPicPr>
+          <p:cNvPr id="5" name="Picture 4" descr="A black background with white text&#10;&#10;Description automatically generated">
+            <a:extLst>
+              <a:ext uri="{FF2B5EF4-FFF2-40B4-BE49-F238E27FC236}">
+                <a16:creationId xmlns:a16="http://schemas.microsoft.com/office/drawing/2014/main" id="{CE9F4C9C-792A-541F-A298-C78A17C00307}"/>
+              </a:ext>
+            </a:extLst>
+          </p:cNvPr>
+          <p:cNvPicPr>
+            <a:picLocks noChangeAspect="1"/>
+          </p:cNvPicPr>
+          <p:nvPr/>
+        </p:nvPicPr>
+        <p:blipFill>
+          <a:blip r:embed="rId2"/>
+          <a:stretch>
+            <a:fillRect/>
+          </a:stretch>
+        </p:blipFill>
+        <p:spPr>
+          <a:xfrm>
+            <a:off x="6810935" y="1419785"/>
+            <a:ext cx="4018430" cy="4018430"/>
+          </a:xfrm>
+          <a:prstGeom prst="rect">
+            <a:avLst/>
+          </a:prstGeom>
+        </p:spPr>
+      </p:pic>
     </p:spTree>
     <p:extLst>
       <p:ext uri="{BB962C8B-B14F-4D97-AF65-F5344CB8AC3E}">
@@ -3717,13 +4073,18 @@
           <a:lstStyle/>
           <a:p>
             <a:r>
-              <a:rPr lang="en-US" dirty="0">
+              <a:rPr lang="en-US">
                 <a:latin typeface="Menlo" panose="020B0609030804020204" pitchFamily="49" charset="0"/>
                 <a:ea typeface="Menlo" panose="020B0609030804020204" pitchFamily="49" charset="0"/>
                 <a:cs typeface="Menlo" panose="020B0609030804020204" pitchFamily="49" charset="0"/>
               </a:rPr>
               <a:t>Origin story	</a:t>
             </a:r>
+            <a:endParaRPr lang="en-US" dirty="0">
+              <a:latin typeface="Menlo" panose="020B0609030804020204" pitchFamily="49" charset="0"/>
+              <a:ea typeface="Menlo" panose="020B0609030804020204" pitchFamily="49" charset="0"/>
+              <a:cs typeface="Menlo" panose="020B0609030804020204" pitchFamily="49" charset="0"/>
+            </a:endParaRPr>
           </a:p>
         </p:txBody>
       </p:sp>
@@ -3756,20 +4117,12 @@
           <a:lstStyle/>
           <a:p>
             <a:r>
-              <a:rPr lang="en-US" sz="1500">
-                <a:latin typeface="Menlo" panose="020B0609030804020204" pitchFamily="49" charset="0"/>
-                <a:ea typeface="Menlo" panose="020B0609030804020204" pitchFamily="49" charset="0"/>
-                <a:cs typeface="Menlo" panose="020B0609030804020204" pitchFamily="49" charset="0"/>
-              </a:rPr>
-              <a:t>All came from </a:t>
-            </a:r>
-            <a:r>
               <a:rPr lang="en-US" sz="1500" dirty="0">
                 <a:latin typeface="Menlo" panose="020B0609030804020204" pitchFamily="49" charset="0"/>
                 <a:ea typeface="Menlo" panose="020B0609030804020204" pitchFamily="49" charset="0"/>
                 <a:cs typeface="Menlo" panose="020B0609030804020204" pitchFamily="49" charset="0"/>
               </a:rPr>
-              <a:t>call with virgin media</a:t>
+              <a:t>All came from call with virgin media</a:t>
             </a:r>
           </a:p>
         </p:txBody>
@@ -3957,15 +4310,16 @@
           <a:lstStyle/>
           <a:p>
             <a:r>
-              <a:rPr lang="en-US" dirty="0"/>
+              <a:rPr lang="en-US"/>
               <a:t>Providing a view into a situation, viewport is a window, but we can also look at it as “view” + “portal”</a:t>
             </a:r>
           </a:p>
           <a:p>
             <a:r>
-              <a:rPr lang="en-US" dirty="0"/>
+              <a:rPr lang="en-US"/>
               <a:t>Sharing a view or perspective or insight</a:t>
             </a:r>
+            <a:endParaRPr lang="en-US" dirty="0"/>
           </a:p>
         </p:txBody>
       </p:sp>

</xml_diff>